<commit_message>
poster updated - only rv dual core diagram is missing
</commit_message>
<xml_diff>
--- a/docs/project_poster.pptx
+++ b/docs/project_poster.pptx
@@ -3464,61 +3464,7 @@
                 </a:solidFill>
                 <a:latin typeface="Congenial" panose="02000503040000020004" pitchFamily="2" charset="0"/>
               </a:rPr>
-              <a:t>I would like to thank Dr. Fearghal Morgan for his support and guidance, and Roshan George, JP Byrne and </a:t>
-            </a:r>
-            <a:r>
-              <a:rPr lang="en-IE" dirty="0" err="1">
-                <a:solidFill>
-                  <a:schemeClr val="tx1"/>
-                </a:solidFill>
-                <a:latin typeface="Congenial" panose="02000503040000020004" pitchFamily="2" charset="0"/>
-              </a:rPr>
-              <a:t>Abishek</a:t>
-            </a:r>
-            <a:r>
-              <a:rPr lang="en-IE" dirty="0">
-                <a:solidFill>
-                  <a:schemeClr val="tx1"/>
-                </a:solidFill>
-                <a:latin typeface="Congenial" panose="02000503040000020004" pitchFamily="2" charset="0"/>
-              </a:rPr>
-              <a:t> </a:t>
-            </a:r>
-            <a:r>
-              <a:rPr lang="en-IE" dirty="0" err="1">
-                <a:solidFill>
-                  <a:schemeClr val="tx1"/>
-                </a:solidFill>
-                <a:latin typeface="Congenial" panose="02000503040000020004" pitchFamily="2" charset="0"/>
-              </a:rPr>
-              <a:t>Bupathi</a:t>
-            </a:r>
-            <a:r>
-              <a:rPr lang="en-IE" dirty="0">
-                <a:solidFill>
-                  <a:schemeClr val="tx1"/>
-                </a:solidFill>
-                <a:latin typeface="Congenial" panose="02000503040000020004" pitchFamily="2" charset="0"/>
-              </a:rPr>
-              <a:t> for their previous work on </a:t>
-            </a:r>
-            <a:r>
-              <a:rPr lang="en-IE" dirty="0" err="1">
-                <a:solidFill>
-                  <a:schemeClr val="tx1"/>
-                </a:solidFill>
-                <a:latin typeface="Congenial" panose="02000503040000020004" pitchFamily="2" charset="0"/>
-              </a:rPr>
-              <a:t>HDLGen</a:t>
-            </a:r>
-            <a:r>
-              <a:rPr lang="en-IE" dirty="0">
-                <a:solidFill>
-                  <a:schemeClr val="tx1"/>
-                </a:solidFill>
-                <a:latin typeface="Congenial" panose="02000503040000020004" pitchFamily="2" charset="0"/>
-              </a:rPr>
-              <a:t>-ChatGPT, PYNQ and RISC-V.</a:t>
+              <a:t>I would like to thank Dr. Fearghal Morgan for his support and guidance, and Roshan George, JP Byrne and Abishek Bupathi for their previous work on HDLGen-ChatGPT, PYNQ and RISC-V.</a:t>
             </a:r>
           </a:p>
         </p:txBody>
@@ -4589,61 +4535,7 @@
                 </a:solidFill>
                 <a:latin typeface="Congenial" panose="02000503040000020004" pitchFamily="2" charset="0"/>
               </a:rPr>
-              <a:t>I would like to thank Dr. Fearghal Morgan for his support and guidance, and Roshan George, JP Byrne and </a:t>
-            </a:r>
-            <a:r>
-              <a:rPr lang="en-IE" dirty="0" err="1">
-                <a:solidFill>
-                  <a:schemeClr val="tx1"/>
-                </a:solidFill>
-                <a:latin typeface="Congenial" panose="02000503040000020004" pitchFamily="2" charset="0"/>
-              </a:rPr>
-              <a:t>Abishek</a:t>
-            </a:r>
-            <a:r>
-              <a:rPr lang="en-IE" dirty="0">
-                <a:solidFill>
-                  <a:schemeClr val="tx1"/>
-                </a:solidFill>
-                <a:latin typeface="Congenial" panose="02000503040000020004" pitchFamily="2" charset="0"/>
-              </a:rPr>
-              <a:t> </a:t>
-            </a:r>
-            <a:r>
-              <a:rPr lang="en-IE" dirty="0" err="1">
-                <a:solidFill>
-                  <a:schemeClr val="tx1"/>
-                </a:solidFill>
-                <a:latin typeface="Congenial" panose="02000503040000020004" pitchFamily="2" charset="0"/>
-              </a:rPr>
-              <a:t>Bupathi</a:t>
-            </a:r>
-            <a:r>
-              <a:rPr lang="en-IE" dirty="0">
-                <a:solidFill>
-                  <a:schemeClr val="tx1"/>
-                </a:solidFill>
-                <a:latin typeface="Congenial" panose="02000503040000020004" pitchFamily="2" charset="0"/>
-              </a:rPr>
-              <a:t> for their previous work on </a:t>
-            </a:r>
-            <a:r>
-              <a:rPr lang="en-IE" dirty="0" err="1">
-                <a:solidFill>
-                  <a:schemeClr val="tx1"/>
-                </a:solidFill>
-                <a:latin typeface="Congenial" panose="02000503040000020004" pitchFamily="2" charset="0"/>
-              </a:rPr>
-              <a:t>HDLGen</a:t>
-            </a:r>
-            <a:r>
-              <a:rPr lang="en-IE" dirty="0">
-                <a:solidFill>
-                  <a:schemeClr val="tx1"/>
-                </a:solidFill>
-                <a:latin typeface="Congenial" panose="02000503040000020004" pitchFamily="2" charset="0"/>
-              </a:rPr>
-              <a:t>-ChatGPT, PYNQ and RISC-V.</a:t>
+              <a:t>I would like to thank Dr. Fearghal Morgan for his support and guidance, and Roshan George, JP Byrne and Abishek Bupathi for their previous work on HDLGen-ChatGPT, PYNQ and RISC-V.</a:t>
             </a:r>
           </a:p>
         </p:txBody>
@@ -7251,7 +7143,7 @@
         <p:spPr>
           <a:xfrm>
             <a:off x="181745" y="3011884"/>
-            <a:ext cx="7196186" cy="3640603"/>
+            <a:ext cx="7196186" cy="3194211"/>
           </a:xfrm>
           <a:prstGeom prst="rect">
             <a:avLst/>
@@ -7282,44 +7174,15 @@
           <a:bodyPr rtlCol="0" anchor="t"/>
           <a:lstStyle/>
           <a:p>
-            <a:endParaRPr lang="en-IE" dirty="0">
-              <a:solidFill>
-                <a:schemeClr val="tx1"/>
-              </a:solidFill>
-              <a:latin typeface="Congenial" panose="02000503040000020004" pitchFamily="2" charset="0"/>
-            </a:endParaRPr>
-          </a:p>
-          <a:p>
-            <a:endParaRPr lang="en-IE" dirty="0">
-              <a:solidFill>
-                <a:schemeClr val="tx1"/>
-              </a:solidFill>
-              <a:latin typeface="Congenial" panose="02000503040000020004" pitchFamily="2" charset="0"/>
-            </a:endParaRPr>
-          </a:p>
-          <a:p>
-            <a:endParaRPr lang="en-IE" dirty="0">
-              <a:solidFill>
-                <a:schemeClr val="tx1"/>
-              </a:solidFill>
-              <a:latin typeface="Congenial" panose="02000503040000020004" pitchFamily="2" charset="0"/>
-            </a:endParaRPr>
-          </a:p>
-          <a:p>
-            <a:endParaRPr lang="en-IE" dirty="0">
-              <a:solidFill>
-                <a:schemeClr val="tx1"/>
-              </a:solidFill>
-              <a:latin typeface="Congenial" panose="02000503040000020004" pitchFamily="2" charset="0"/>
-            </a:endParaRPr>
-          </a:p>
-          <a:p>
-            <a:endParaRPr lang="en-IE" dirty="0">
-              <a:solidFill>
-                <a:schemeClr val="tx1"/>
-              </a:solidFill>
-              <a:latin typeface="Congenial" panose="02000503040000020004" pitchFamily="2" charset="0"/>
-            </a:endParaRPr>
+            <a:r>
+              <a:rPr lang="en-IE" dirty="0">
+                <a:solidFill>
+                  <a:schemeClr val="tx1"/>
+                </a:solidFill>
+                <a:latin typeface="Congenial" panose="02000503040000020004" pitchFamily="2" charset="0"/>
+              </a:rPr>
+              <a:t>This project is an implementation of three key components required to enable faster SoC project deployment and increase accessibility and interaction between PYNQ FPGA hardware, RISC-V Core implementations and students, enthusiasts and educators.</a:t>
+            </a:r>
           </a:p>
           <a:p>
             <a:endParaRPr lang="en-IE" dirty="0">
@@ -7492,61 +7355,7 @@
                 </a:solidFill>
                 <a:latin typeface="Congenial" panose="02000503040000020004" pitchFamily="2" charset="0"/>
               </a:rPr>
-              <a:t>I would like to thank Dr. Fearghal Morgan for his support and guidance, and Roshan George, JP Byrne and </a:t>
-            </a:r>
-            <a:r>
-              <a:rPr lang="en-IE" dirty="0" err="1">
-                <a:solidFill>
-                  <a:schemeClr val="tx1"/>
-                </a:solidFill>
-                <a:latin typeface="Congenial" panose="02000503040000020004" pitchFamily="2" charset="0"/>
-              </a:rPr>
-              <a:t>Abishek</a:t>
-            </a:r>
-            <a:r>
-              <a:rPr lang="en-IE" dirty="0">
-                <a:solidFill>
-                  <a:schemeClr val="tx1"/>
-                </a:solidFill>
-                <a:latin typeface="Congenial" panose="02000503040000020004" pitchFamily="2" charset="0"/>
-              </a:rPr>
-              <a:t> </a:t>
-            </a:r>
-            <a:r>
-              <a:rPr lang="en-IE" dirty="0" err="1">
-                <a:solidFill>
-                  <a:schemeClr val="tx1"/>
-                </a:solidFill>
-                <a:latin typeface="Congenial" panose="02000503040000020004" pitchFamily="2" charset="0"/>
-              </a:rPr>
-              <a:t>Bupathi</a:t>
-            </a:r>
-            <a:r>
-              <a:rPr lang="en-IE" dirty="0">
-                <a:solidFill>
-                  <a:schemeClr val="tx1"/>
-                </a:solidFill>
-                <a:latin typeface="Congenial" panose="02000503040000020004" pitchFamily="2" charset="0"/>
-              </a:rPr>
-              <a:t> for their previous work on </a:t>
-            </a:r>
-            <a:r>
-              <a:rPr lang="en-IE" dirty="0" err="1">
-                <a:solidFill>
-                  <a:schemeClr val="tx1"/>
-                </a:solidFill>
-                <a:latin typeface="Congenial" panose="02000503040000020004" pitchFamily="2" charset="0"/>
-              </a:rPr>
-              <a:t>HDLGen</a:t>
-            </a:r>
-            <a:r>
-              <a:rPr lang="en-IE" dirty="0">
-                <a:solidFill>
-                  <a:schemeClr val="tx1"/>
-                </a:solidFill>
-                <a:latin typeface="Congenial" panose="02000503040000020004" pitchFamily="2" charset="0"/>
-              </a:rPr>
-              <a:t>-ChatGPT, PYNQ and RISC-V.</a:t>
+              <a:t>I would like to thank Dr. Fearghal Morgan for his support and guidance, and Roshan George, JP Byrne and Abishek Bupathi for their previous work on HDLGen-ChatGPT, PYNQ and RISC-V.</a:t>
             </a:r>
           </a:p>
         </p:txBody>
@@ -8146,7 +7955,7 @@
         </p:nvSpPr>
         <p:spPr>
           <a:xfrm>
-            <a:off x="190252" y="6913980"/>
+            <a:off x="186746" y="6509876"/>
             <a:ext cx="7215213" cy="461665"/>
           </a:xfrm>
           <a:prstGeom prst="rect">
@@ -8198,8 +8007,8 @@
         </p:nvSpPr>
         <p:spPr>
           <a:xfrm>
-            <a:off x="205773" y="7396535"/>
-            <a:ext cx="7196186" cy="8162806"/>
+            <a:off x="205773" y="6971541"/>
+            <a:ext cx="7196186" cy="8587800"/>
           </a:xfrm>
           <a:prstGeom prst="rect">
             <a:avLst/>
@@ -8323,6 +8132,14 @@
             </a:endParaRPr>
           </a:p>
           <a:p>
+            <a:endParaRPr lang="en-IE" dirty="0">
+              <a:solidFill>
+                <a:schemeClr val="tx1"/>
+              </a:solidFill>
+              <a:latin typeface="Congenial" panose="02000503040000020004" pitchFamily="2" charset="0"/>
+            </a:endParaRPr>
+          </a:p>
+          <a:p>
             <a:r>
               <a:rPr lang="en-IE" dirty="0">
                 <a:solidFill>
@@ -8433,17 +8250,6 @@
           <a:bodyPr rtlCol="0" anchor="t"/>
           <a:lstStyle/>
           <a:p>
-            <a:r>
-              <a:rPr lang="en-IE" dirty="0">
-                <a:solidFill>
-                  <a:schemeClr val="tx1"/>
-                </a:solidFill>
-                <a:latin typeface="Congenial" panose="02000503040000020004" pitchFamily="2" charset="0"/>
-              </a:rPr>
-              <a:t>This section will either be connected to the objectives section above or added more information :&gt;</a:t>
-            </a:r>
-          </a:p>
-          <a:p>
             <a:endParaRPr lang="en-IE" dirty="0">
               <a:solidFill>
                 <a:schemeClr val="tx1"/>
@@ -8451,55 +8257,8 @@
               <a:latin typeface="Congenial" panose="02000503040000020004" pitchFamily="2" charset="0"/>
             </a:endParaRPr>
           </a:p>
-          <a:p>
-            <a:r>
-              <a:rPr lang="en-IE" dirty="0">
-                <a:solidFill>
-                  <a:schemeClr val="tx1"/>
-                </a:solidFill>
-                <a:latin typeface="Congenial" panose="02000503040000020004" pitchFamily="2" charset="0"/>
-              </a:rPr>
-              <a:t>This section is going to be difficult to produce. We will try our best B)</a:t>
-            </a:r>
-          </a:p>
-        </p:txBody>
-      </p:sp>
-      <p:pic>
-        <p:nvPicPr>
-          <p:cNvPr id="3" name="Picture 2" descr="A close-up of a red circuit board&#10;&#10;Description automatically generated">
-            <a:extLst>
-              <a:ext uri="{FF2B5EF4-FFF2-40B4-BE49-F238E27FC236}">
-                <a16:creationId xmlns:a16="http://schemas.microsoft.com/office/drawing/2014/main" id="{14D85344-7C6A-F70D-3983-C9EFB1FEA0FE}"/>
-              </a:ext>
-            </a:extLst>
-          </p:cNvPr>
-          <p:cNvPicPr>
-            <a:picLocks noChangeAspect="1"/>
-          </p:cNvPicPr>
-          <p:nvPr/>
-        </p:nvPicPr>
-        <p:blipFill>
-          <a:blip r:embed="rId3">
-            <a:extLst>
-              <a:ext uri="{28A0092B-C50C-407E-A947-70E740481C1C}">
-                <a14:useLocalDpi xmlns:a14="http://schemas.microsoft.com/office/drawing/2010/main" val="0"/>
-              </a:ext>
-            </a:extLst>
-          </a:blip>
-          <a:stretch>
-            <a:fillRect/>
-          </a:stretch>
-        </p:blipFill>
-        <p:spPr>
-          <a:xfrm>
-            <a:off x="426016" y="9092674"/>
-            <a:ext cx="2146296" cy="1361507"/>
-          </a:xfrm>
-          <a:prstGeom prst="rect">
-            <a:avLst/>
-          </a:prstGeom>
-        </p:spPr>
-      </p:pic>
+        </p:txBody>
+      </p:sp>
       <p:grpSp>
         <p:nvGrpSpPr>
           <p:cNvPr id="10" name="Group 9">
@@ -8535,7 +8294,7 @@
             <p:nvPr/>
           </p:nvPicPr>
           <p:blipFill>
-            <a:blip r:embed="rId4">
+            <a:blip r:embed="rId3">
               <a:extLst>
                 <a:ext uri="{28A0092B-C50C-407E-A947-70E740481C1C}">
                   <a14:useLocalDpi xmlns:a14="http://schemas.microsoft.com/office/drawing/2010/main" val="0"/>
@@ -8571,7 +8330,7 @@
             <p:nvPr/>
           </p:nvPicPr>
           <p:blipFill>
-            <a:blip r:embed="rId5">
+            <a:blip r:embed="rId4">
               <a:extLst>
                 <a:ext uri="{28A0092B-C50C-407E-A947-70E740481C1C}">
                   <a14:useLocalDpi xmlns:a14="http://schemas.microsoft.com/office/drawing/2010/main" val="0"/>
@@ -8607,7 +8366,7 @@
             <p:nvPr/>
           </p:nvPicPr>
           <p:blipFill>
-            <a:blip r:embed="rId6">
+            <a:blip r:embed="rId5">
               <a:extLst>
                 <a:ext uri="{28A0092B-C50C-407E-A947-70E740481C1C}">
                   <a14:useLocalDpi xmlns:a14="http://schemas.microsoft.com/office/drawing/2010/main" val="0"/>
@@ -8643,7 +8402,7 @@
             <p:nvPr/>
           </p:nvPicPr>
           <p:blipFill>
-            <a:blip r:embed="rId7"/>
+            <a:blip r:embed="rId6"/>
             <a:stretch>
               <a:fillRect/>
             </a:stretch>
@@ -8852,7 +8611,9 @@
               <a:avLst/>
             </a:prstGeom>
             <a:solidFill>
-              <a:schemeClr val="accent4">
+              <a:schemeClr val="accent1">
+                <a:lumMod val="40000"/>
+                <a:lumOff val="60000"/>
                 <a:alpha val="50000"/>
               </a:schemeClr>
             </a:solidFill>
@@ -9430,7 +9191,7 @@
             <p:nvPr/>
           </p:nvPicPr>
           <p:blipFill>
-            <a:blip r:embed="rId8">
+            <a:blip r:embed="rId7">
               <a:extLst>
                 <a:ext uri="{28A0092B-C50C-407E-A947-70E740481C1C}">
                   <a14:useLocalDpi xmlns:a14="http://schemas.microsoft.com/office/drawing/2010/main" val="0"/>
@@ -9691,7 +9452,7 @@
             <p:nvPr/>
           </p:nvPicPr>
           <p:blipFill>
-            <a:blip r:embed="rId9">
+            <a:blip r:embed="rId8">
               <a:extLst>
                 <a:ext uri="{28A0092B-C50C-407E-A947-70E740481C1C}">
                   <a14:useLocalDpi xmlns:a14="http://schemas.microsoft.com/office/drawing/2010/main" val="0"/>
@@ -9902,12 +9663,102 @@
           </p:txBody>
         </p:sp>
       </p:grpSp>
+      <p:sp>
+        <p:nvSpPr>
+          <p:cNvPr id="60" name="Rectangle 59">
+            <a:extLst>
+              <a:ext uri="{FF2B5EF4-FFF2-40B4-BE49-F238E27FC236}">
+                <a16:creationId xmlns:a16="http://schemas.microsoft.com/office/drawing/2014/main" id="{F59B4EBD-0390-5255-B4D5-F1ECD8DDA2D8}"/>
+              </a:ext>
+            </a:extLst>
+          </p:cNvPr>
+          <p:cNvSpPr/>
+          <p:nvPr/>
+        </p:nvSpPr>
+        <p:spPr>
+          <a:xfrm>
+            <a:off x="359898" y="8427996"/>
+            <a:ext cx="6848979" cy="1886018"/>
+          </a:xfrm>
+          <a:prstGeom prst="rect">
+            <a:avLst/>
+          </a:prstGeom>
+          <a:solidFill>
+            <a:schemeClr val="accent1">
+              <a:lumMod val="40000"/>
+              <a:lumOff val="60000"/>
+              <a:alpha val="50000"/>
+            </a:schemeClr>
+          </a:solidFill>
+          <a:ln>
+            <a:noFill/>
+          </a:ln>
+        </p:spPr>
+        <p:style>
+          <a:lnRef idx="0">
+            <a:scrgbClr r="0" g="0" b="0"/>
+          </a:lnRef>
+          <a:fillRef idx="0">
+            <a:scrgbClr r="0" g="0" b="0"/>
+          </a:fillRef>
+          <a:effectRef idx="0">
+            <a:scrgbClr r="0" g="0" b="0"/>
+          </a:effectRef>
+          <a:fontRef idx="minor">
+            <a:schemeClr val="lt1"/>
+          </a:fontRef>
+        </p:style>
+        <p:txBody>
+          <a:bodyPr rtlCol="0" anchor="ctr"/>
+          <a:lstStyle/>
+          <a:p>
+            <a:pPr algn="ctr"/>
+            <a:endParaRPr lang="en-IE" dirty="0"/>
+          </a:p>
+        </p:txBody>
+      </p:sp>
       <p:pic>
         <p:nvPicPr>
           <p:cNvPr id="20" name="Picture 19" descr="A blue and black logo&#10;&#10;Description automatically generated">
             <a:extLst>
               <a:ext uri="{FF2B5EF4-FFF2-40B4-BE49-F238E27FC236}">
                 <a16:creationId xmlns:a16="http://schemas.microsoft.com/office/drawing/2014/main" id="{0352DE73-1B56-05B8-2FA6-692CB1394681}"/>
+              </a:ext>
+            </a:extLst>
+          </p:cNvPr>
+          <p:cNvPicPr>
+            <a:picLocks noChangeAspect="1"/>
+          </p:cNvPicPr>
+          <p:nvPr/>
+        </p:nvPicPr>
+        <p:blipFill>
+          <a:blip r:embed="rId9">
+            <a:extLst>
+              <a:ext uri="{28A0092B-C50C-407E-A947-70E740481C1C}">
+                <a14:useLocalDpi xmlns:a14="http://schemas.microsoft.com/office/drawing/2010/main" val="0"/>
+              </a:ext>
+            </a:extLst>
+          </a:blip>
+          <a:stretch>
+            <a:fillRect/>
+          </a:stretch>
+        </p:blipFill>
+        <p:spPr>
+          <a:xfrm>
+            <a:off x="3171670" y="8366315"/>
+            <a:ext cx="1640199" cy="757166"/>
+          </a:xfrm>
+          <a:prstGeom prst="rect">
+            <a:avLst/>
+          </a:prstGeom>
+        </p:spPr>
+      </p:pic>
+      <p:pic>
+        <p:nvPicPr>
+          <p:cNvPr id="26" name="Picture 25" descr="A logo of a google chrome&#10;&#10;Description automatically generated">
+            <a:extLst>
+              <a:ext uri="{FF2B5EF4-FFF2-40B4-BE49-F238E27FC236}">
+                <a16:creationId xmlns:a16="http://schemas.microsoft.com/office/drawing/2014/main" id="{6BD39CDE-FB5E-07D4-34A3-4B81EC571B34}"/>
               </a:ext>
             </a:extLst>
           </p:cNvPr>
@@ -9930,50 +9781,14 @@
         </p:blipFill>
         <p:spPr>
           <a:xfrm>
-            <a:off x="3171670" y="8527679"/>
-            <a:ext cx="1640199" cy="757166"/>
+            <a:off x="5443017" y="8814487"/>
+            <a:ext cx="1361507" cy="1361507"/>
           </a:xfrm>
           <a:prstGeom prst="rect">
             <a:avLst/>
           </a:prstGeom>
         </p:spPr>
       </p:pic>
-      <p:pic>
-        <p:nvPicPr>
-          <p:cNvPr id="26" name="Picture 25" descr="A logo of a google chrome&#10;&#10;Description automatically generated">
-            <a:extLst>
-              <a:ext uri="{FF2B5EF4-FFF2-40B4-BE49-F238E27FC236}">
-                <a16:creationId xmlns:a16="http://schemas.microsoft.com/office/drawing/2014/main" id="{6BD39CDE-FB5E-07D4-34A3-4B81EC571B34}"/>
-              </a:ext>
-            </a:extLst>
-          </p:cNvPr>
-          <p:cNvPicPr>
-            <a:picLocks noChangeAspect="1"/>
-          </p:cNvPicPr>
-          <p:nvPr/>
-        </p:nvPicPr>
-        <p:blipFill>
-          <a:blip r:embed="rId11">
-            <a:extLst>
-              <a:ext uri="{28A0092B-C50C-407E-A947-70E740481C1C}">
-                <a14:useLocalDpi xmlns:a14="http://schemas.microsoft.com/office/drawing/2010/main" val="0"/>
-              </a:ext>
-            </a:extLst>
-          </a:blip>
-          <a:stretch>
-            <a:fillRect/>
-          </a:stretch>
-        </p:blipFill>
-        <p:spPr>
-          <a:xfrm>
-            <a:off x="5443017" y="9029639"/>
-            <a:ext cx="1361507" cy="1361507"/>
-          </a:xfrm>
-          <a:prstGeom prst="rect">
-            <a:avLst/>
-          </a:prstGeom>
-        </p:spPr>
-      </p:pic>
       <p:sp>
         <p:nvSpPr>
           <p:cNvPr id="49" name="Arc 48">
@@ -9988,7 +9803,7 @@
         </p:nvSpPr>
         <p:spPr>
           <a:xfrm rot="19123379">
-            <a:off x="2395022" y="9288534"/>
+            <a:off x="2395022" y="9073382"/>
             <a:ext cx="3114155" cy="3073348"/>
           </a:xfrm>
           <a:prstGeom prst="arc">
@@ -10039,7 +9854,7 @@
         </p:nvSpPr>
         <p:spPr>
           <a:xfrm>
-            <a:off x="2637186" y="9889141"/>
+            <a:off x="2637186" y="9673989"/>
             <a:ext cx="2624326" cy="584775"/>
           </a:xfrm>
           <a:prstGeom prst="rect">
@@ -10081,13 +9896,13 @@
           <p:nvPr/>
         </p:nvPicPr>
         <p:blipFill rotWithShape="1">
-          <a:blip r:embed="rId12"/>
+          <a:blip r:embed="rId11"/>
           <a:srcRect l="5768" t="2893" r="2238"/>
           <a:stretch/>
         </p:blipFill>
         <p:spPr>
           <a:xfrm>
-            <a:off x="995637" y="12023726"/>
+            <a:off x="995637" y="11791497"/>
             <a:ext cx="2953278" cy="3173907"/>
           </a:xfrm>
           <a:prstGeom prst="rect">
@@ -10110,14 +9925,14 @@
           <p:nvPr/>
         </p:nvPicPr>
         <p:blipFill>
-          <a:blip r:embed="rId13"/>
+          <a:blip r:embed="rId12"/>
           <a:stretch>
             <a:fillRect/>
           </a:stretch>
         </p:blipFill>
         <p:spPr>
           <a:xfrm>
-            <a:off x="4024288" y="12030054"/>
+            <a:off x="4024288" y="11797825"/>
             <a:ext cx="2742136" cy="3167578"/>
           </a:xfrm>
           <a:prstGeom prst="rect">
@@ -10139,8 +9954,8 @@
         </p:nvSpPr>
         <p:spPr>
           <a:xfrm>
-            <a:off x="376217" y="15219132"/>
-            <a:ext cx="6797742" cy="276999"/>
+            <a:off x="186746" y="14960294"/>
+            <a:ext cx="7172159" cy="646331"/>
           </a:xfrm>
           <a:prstGeom prst="rect">
             <a:avLst/>
@@ -10155,14 +9970,220 @@
           <a:p>
             <a:pPr algn="ctr"/>
             <a:r>
-              <a:rPr lang="en-IE" sz="1200" b="1" dirty="0">
+              <a:rPr lang="en-IE" dirty="0">
                 <a:latin typeface="Congenial" panose="02000503040000020004" pitchFamily="2" charset="0"/>
               </a:rPr>
-              <a:t>Jupyter Notebook Generated by SoC Builder opened on remote PYNQ accessed over Ngrok Tunnel</a:t>
-            </a:r>
-            <a:endParaRPr lang="en-IE" sz="1200" dirty="0">
+              <a:t>Jupyter Notebook generated by SoC Builder opened on remote PYNQ accessed over Ngrok Tunnel</a:t>
+            </a:r>
+          </a:p>
+        </p:txBody>
+      </p:sp>
+      <p:pic>
+        <p:nvPicPr>
+          <p:cNvPr id="3" name="Picture 2" descr="A close-up of a red circuit board&#10;&#10;Description automatically generated">
+            <a:extLst>
+              <a:ext uri="{FF2B5EF4-FFF2-40B4-BE49-F238E27FC236}">
+                <a16:creationId xmlns:a16="http://schemas.microsoft.com/office/drawing/2014/main" id="{14D85344-7C6A-F70D-3983-C9EFB1FEA0FE}"/>
+              </a:ext>
+            </a:extLst>
+          </p:cNvPr>
+          <p:cNvPicPr>
+            <a:picLocks noChangeAspect="1"/>
+          </p:cNvPicPr>
+          <p:nvPr/>
+        </p:nvPicPr>
+        <p:blipFill>
+          <a:blip r:embed="rId13">
+            <a:extLst>
+              <a:ext uri="{28A0092B-C50C-407E-A947-70E740481C1C}">
+                <a14:useLocalDpi xmlns:a14="http://schemas.microsoft.com/office/drawing/2010/main" val="0"/>
+              </a:ext>
+            </a:extLst>
+          </a:blip>
+          <a:stretch>
+            <a:fillRect/>
+          </a:stretch>
+        </p:blipFill>
+        <p:spPr>
+          <a:xfrm>
+            <a:off x="426016" y="8877522"/>
+            <a:ext cx="2146296" cy="1361507"/>
+          </a:xfrm>
+          <a:prstGeom prst="rect">
+            <a:avLst/>
+          </a:prstGeom>
+        </p:spPr>
+      </p:pic>
+      <p:sp>
+        <p:nvSpPr>
+          <p:cNvPr id="61" name="Rectangle 60">
+            <a:extLst>
+              <a:ext uri="{FF2B5EF4-FFF2-40B4-BE49-F238E27FC236}">
+                <a16:creationId xmlns:a16="http://schemas.microsoft.com/office/drawing/2014/main" id="{35FB26B1-8ABB-05E5-40BC-2EEF43C7DCB0}"/>
+              </a:ext>
+            </a:extLst>
+          </p:cNvPr>
+          <p:cNvSpPr/>
+          <p:nvPr/>
+        </p:nvSpPr>
+        <p:spPr>
+          <a:xfrm>
+            <a:off x="7913422" y="16323499"/>
+            <a:ext cx="6848979" cy="3102511"/>
+          </a:xfrm>
+          <a:prstGeom prst="rect">
+            <a:avLst/>
+          </a:prstGeom>
+          <a:solidFill>
+            <a:schemeClr val="accent1">
+              <a:lumMod val="40000"/>
+              <a:lumOff val="60000"/>
+              <a:alpha val="50000"/>
+            </a:schemeClr>
+          </a:solidFill>
+          <a:ln>
+            <a:noFill/>
+          </a:ln>
+        </p:spPr>
+        <p:style>
+          <a:lnRef idx="0">
+            <a:scrgbClr r="0" g="0" b="0"/>
+          </a:lnRef>
+          <a:fillRef idx="0">
+            <a:scrgbClr r="0" g="0" b="0"/>
+          </a:fillRef>
+          <a:effectRef idx="0">
+            <a:scrgbClr r="0" g="0" b="0"/>
+          </a:effectRef>
+          <a:fontRef idx="minor">
+            <a:schemeClr val="lt1"/>
+          </a:fontRef>
+        </p:style>
+        <p:txBody>
+          <a:bodyPr rtlCol="0" anchor="ctr"/>
+          <a:lstStyle/>
+          <a:p>
+            <a:pPr algn="ctr"/>
+            <a:endParaRPr lang="en-IE" dirty="0"/>
+          </a:p>
+        </p:txBody>
+      </p:sp>
+      <p:sp>
+        <p:nvSpPr>
+          <p:cNvPr id="62" name="TextBox 61">
+            <a:extLst>
+              <a:ext uri="{FF2B5EF4-FFF2-40B4-BE49-F238E27FC236}">
+                <a16:creationId xmlns:a16="http://schemas.microsoft.com/office/drawing/2014/main" id="{4B259C54-158C-306B-5D8C-C23FA627ADDC}"/>
+              </a:ext>
+            </a:extLst>
+          </p:cNvPr>
+          <p:cNvSpPr txBox="1"/>
+          <p:nvPr/>
+        </p:nvSpPr>
+        <p:spPr>
+          <a:xfrm>
+            <a:off x="256466" y="16319465"/>
+            <a:ext cx="7535644" cy="3016210"/>
+          </a:xfrm>
+          <a:prstGeom prst="rect">
+            <a:avLst/>
+          </a:prstGeom>
+          <a:noFill/>
+        </p:spPr>
+        <p:txBody>
+          <a:bodyPr wrap="square" rtlCol="0">
+            <a:spAutoFit/>
+          </a:bodyPr>
+          <a:lstStyle/>
+          <a:p>
+            <a:pPr marL="285750" indent="-285750">
+              <a:spcBef>
+                <a:spcPts val="600"/>
+              </a:spcBef>
+              <a:buFont typeface="Arial" panose="020B0604020202020204" pitchFamily="34" charset="0"/>
+              <a:buChar char="•"/>
+            </a:pPr>
+            <a:r>
+              <a:rPr lang="en-IE" dirty="0">
+                <a:solidFill>
+                  <a:schemeClr val="tx1"/>
+                </a:solidFill>
+                <a:latin typeface="Congenial" panose="02000503040000020004" pitchFamily="2" charset="0"/>
+              </a:rPr>
+              <a:t>The purpose of the RISC-V learning platform through the remote laboratory is to encourage interaction and exploration of RISC-V ISA on real hardware, rather than simulation</a:t>
+            </a:r>
+            <a:endParaRPr lang="en-IE" dirty="0">
               <a:latin typeface="Congenial" panose="02000503040000020004" pitchFamily="2" charset="0"/>
             </a:endParaRPr>
+          </a:p>
+          <a:p>
+            <a:pPr marL="285750" indent="-285750">
+              <a:spcBef>
+                <a:spcPts val="600"/>
+              </a:spcBef>
+              <a:buFont typeface="Arial" panose="020B0604020202020204" pitchFamily="34" charset="0"/>
+              <a:buChar char="•"/>
+            </a:pPr>
+            <a:r>
+              <a:rPr lang="en-IE" dirty="0">
+                <a:solidFill>
+                  <a:schemeClr val="tx1"/>
+                </a:solidFill>
+                <a:latin typeface="Congenial" panose="02000503040000020004" pitchFamily="2" charset="0"/>
+              </a:rPr>
+              <a:t>The learning platform will consist of two RISC-V cores. One of which the user will program using RISC-V assembly, </a:t>
+            </a:r>
+            <a:r>
+              <a:rPr lang="en-IE" dirty="0">
+                <a:latin typeface="Congenial" panose="02000503040000020004" pitchFamily="2" charset="0"/>
+              </a:rPr>
+              <a:t>T</a:t>
+            </a:r>
+            <a:r>
+              <a:rPr lang="en-IE" dirty="0">
+                <a:solidFill>
+                  <a:schemeClr val="tx1"/>
+                </a:solidFill>
+                <a:latin typeface="Congenial" panose="02000503040000020004" pitchFamily="2" charset="0"/>
+              </a:rPr>
+              <a:t>he other will remain hidden, only visible to the core #1 by I/O ports. Core #2 will imitate a peripheral device.</a:t>
+            </a:r>
+          </a:p>
+          <a:p>
+            <a:pPr marL="285750" indent="-285750">
+              <a:spcBef>
+                <a:spcPts val="600"/>
+              </a:spcBef>
+              <a:buFont typeface="Arial" panose="020B0604020202020204" pitchFamily="34" charset="0"/>
+              <a:buChar char="•"/>
+            </a:pPr>
+            <a:r>
+              <a:rPr lang="en-IE" dirty="0">
+                <a:solidFill>
+                  <a:schemeClr val="tx1"/>
+                </a:solidFill>
+                <a:latin typeface="Congenial" panose="02000503040000020004" pitchFamily="2" charset="0"/>
+              </a:rPr>
+              <a:t>The goal of the user is to interface with the hidden peripheral. The hidden peripheral changes depending on the difficulty level. For example, an interrupt controller or I</a:t>
+            </a:r>
+            <a:r>
+              <a:rPr lang="en-IE" baseline="30000" dirty="0">
+                <a:solidFill>
+                  <a:schemeClr val="tx1"/>
+                </a:solidFill>
+                <a:latin typeface="Congenial" panose="02000503040000020004" pitchFamily="2" charset="0"/>
+              </a:rPr>
+              <a:t>2</a:t>
+            </a:r>
+            <a:r>
+              <a:rPr lang="en-IE" dirty="0">
+                <a:solidFill>
+                  <a:schemeClr val="tx1"/>
+                </a:solidFill>
+                <a:latin typeface="Congenial" panose="02000503040000020004" pitchFamily="2" charset="0"/>
+              </a:rPr>
+              <a:t>C device.</a:t>
+            </a:r>
           </a:p>
         </p:txBody>
       </p:sp>

</xml_diff>

<commit_message>
finished proj poster, added to readme, uploaded png
</commit_message>
<xml_diff>
--- a/docs/project_poster.pptx
+++ b/docs/project_poster.pptx
@@ -10187,6 +10187,625 @@
           </a:p>
         </p:txBody>
       </p:sp>
+      <p:sp>
+        <p:nvSpPr>
+          <p:cNvPr id="63" name="Rectangle: Rounded Corners 62">
+            <a:extLst>
+              <a:ext uri="{FF2B5EF4-FFF2-40B4-BE49-F238E27FC236}">
+                <a16:creationId xmlns:a16="http://schemas.microsoft.com/office/drawing/2014/main" id="{614C9CC0-91B3-5C2B-31E2-B3F4B95DE55B}"/>
+              </a:ext>
+            </a:extLst>
+          </p:cNvPr>
+          <p:cNvSpPr/>
+          <p:nvPr/>
+        </p:nvSpPr>
+        <p:spPr>
+          <a:xfrm>
+            <a:off x="8029390" y="16452482"/>
+            <a:ext cx="1437339" cy="2883193"/>
+          </a:xfrm>
+          <a:prstGeom prst="roundRect">
+            <a:avLst/>
+          </a:prstGeom>
+          <a:solidFill>
+            <a:schemeClr val="accent5">
+              <a:lumMod val="60000"/>
+              <a:lumOff val="40000"/>
+            </a:schemeClr>
+          </a:solidFill>
+        </p:spPr>
+        <p:style>
+          <a:lnRef idx="2">
+            <a:schemeClr val="accent5">
+              <a:shade val="15000"/>
+            </a:schemeClr>
+          </a:lnRef>
+          <a:fillRef idx="1">
+            <a:schemeClr val="accent5"/>
+          </a:fillRef>
+          <a:effectRef idx="0">
+            <a:schemeClr val="accent5"/>
+          </a:effectRef>
+          <a:fontRef idx="minor">
+            <a:schemeClr val="lt1"/>
+          </a:fontRef>
+        </p:style>
+        <p:txBody>
+          <a:bodyPr rtlCol="0" anchor="t"/>
+          <a:lstStyle/>
+          <a:p>
+            <a:pPr algn="ctr"/>
+            <a:r>
+              <a:rPr lang="en-IE" dirty="0">
+                <a:solidFill>
+                  <a:sysClr val="windowText" lastClr="000000"/>
+                </a:solidFill>
+                <a:latin typeface="Congenial Black" panose="02000503040000020004" pitchFamily="2" charset="0"/>
+              </a:rPr>
+              <a:t>PYNQ Jupyter Notebook Interface</a:t>
+            </a:r>
+          </a:p>
+        </p:txBody>
+      </p:sp>
+      <p:pic>
+        <p:nvPicPr>
+          <p:cNvPr id="64" name="Picture 63" descr="A black and grey logo&#10;&#10;Description automatically generated">
+            <a:extLst>
+              <a:ext uri="{FF2B5EF4-FFF2-40B4-BE49-F238E27FC236}">
+                <a16:creationId xmlns:a16="http://schemas.microsoft.com/office/drawing/2014/main" id="{5E4DCD52-DAEB-C3EE-D135-DD0C8A5195EC}"/>
+              </a:ext>
+            </a:extLst>
+          </p:cNvPr>
+          <p:cNvPicPr>
+            <a:picLocks noChangeAspect="1"/>
+          </p:cNvPicPr>
+          <p:nvPr/>
+        </p:nvPicPr>
+        <p:blipFill>
+          <a:blip r:embed="rId8">
+            <a:extLst>
+              <a:ext uri="{28A0092B-C50C-407E-A947-70E740481C1C}">
+                <a14:useLocalDpi xmlns:a14="http://schemas.microsoft.com/office/drawing/2010/main" val="0"/>
+              </a:ext>
+            </a:extLst>
+          </a:blip>
+          <a:stretch>
+            <a:fillRect/>
+          </a:stretch>
+        </p:blipFill>
+        <p:spPr>
+          <a:xfrm>
+            <a:off x="8115299" y="18785781"/>
+            <a:ext cx="1272420" cy="454294"/>
+          </a:xfrm>
+          <a:prstGeom prst="roundRect">
+            <a:avLst>
+              <a:gd name="adj" fmla="val 25053"/>
+            </a:avLst>
+          </a:prstGeom>
+          <a:solidFill>
+            <a:schemeClr val="bg1"/>
+          </a:solidFill>
+          <a:ln w="19050">
+            <a:solidFill>
+              <a:schemeClr val="accent5">
+                <a:shade val="15000"/>
+              </a:schemeClr>
+            </a:solidFill>
+          </a:ln>
+        </p:spPr>
+      </p:pic>
+      <p:pic>
+        <p:nvPicPr>
+          <p:cNvPr id="66" name="Picture 65" descr="A logo with orange and grey circles&#10;&#10;Description automatically generated">
+            <a:extLst>
+              <a:ext uri="{FF2B5EF4-FFF2-40B4-BE49-F238E27FC236}">
+                <a16:creationId xmlns:a16="http://schemas.microsoft.com/office/drawing/2014/main" id="{8CA8B793-5F78-218B-2C53-7218BB4B51DA}"/>
+              </a:ext>
+            </a:extLst>
+          </p:cNvPr>
+          <p:cNvPicPr>
+            <a:picLocks noChangeAspect="1"/>
+          </p:cNvPicPr>
+          <p:nvPr/>
+        </p:nvPicPr>
+        <p:blipFill>
+          <a:blip r:embed="rId14">
+            <a:extLst>
+              <a:ext uri="{28A0092B-C50C-407E-A947-70E740481C1C}">
+                <a14:useLocalDpi xmlns:a14="http://schemas.microsoft.com/office/drawing/2010/main" val="0"/>
+              </a:ext>
+            </a:extLst>
+          </a:blip>
+          <a:stretch>
+            <a:fillRect/>
+          </a:stretch>
+        </p:blipFill>
+        <p:spPr>
+          <a:xfrm>
+            <a:off x="8374085" y="17806944"/>
+            <a:ext cx="747947" cy="866995"/>
+          </a:xfrm>
+          <a:prstGeom prst="roundRect">
+            <a:avLst/>
+          </a:prstGeom>
+          <a:solidFill>
+            <a:schemeClr val="bg1"/>
+          </a:solidFill>
+          <a:ln w="19050">
+            <a:solidFill>
+              <a:schemeClr val="tx1"/>
+            </a:solidFill>
+          </a:ln>
+        </p:spPr>
+      </p:pic>
+      <p:sp>
+        <p:nvSpPr>
+          <p:cNvPr id="70" name="Rectangle: Rounded Corners 69">
+            <a:extLst>
+              <a:ext uri="{FF2B5EF4-FFF2-40B4-BE49-F238E27FC236}">
+                <a16:creationId xmlns:a16="http://schemas.microsoft.com/office/drawing/2014/main" id="{3246562F-8D29-DDE8-AD92-8E3C9C9D9862}"/>
+              </a:ext>
+            </a:extLst>
+          </p:cNvPr>
+          <p:cNvSpPr/>
+          <p:nvPr/>
+        </p:nvSpPr>
+        <p:spPr>
+          <a:xfrm>
+            <a:off x="10415029" y="16990539"/>
+            <a:ext cx="1775009" cy="1802356"/>
+          </a:xfrm>
+          <a:prstGeom prst="roundRect">
+            <a:avLst/>
+          </a:prstGeom>
+          <a:solidFill>
+            <a:schemeClr val="bg1"/>
+          </a:solidFill>
+        </p:spPr>
+        <p:style>
+          <a:lnRef idx="2">
+            <a:schemeClr val="accent1">
+              <a:shade val="15000"/>
+            </a:schemeClr>
+          </a:lnRef>
+          <a:fillRef idx="1">
+            <a:schemeClr val="accent1"/>
+          </a:fillRef>
+          <a:effectRef idx="0">
+            <a:schemeClr val="accent1"/>
+          </a:effectRef>
+          <a:fontRef idx="minor">
+            <a:schemeClr val="lt1"/>
+          </a:fontRef>
+        </p:style>
+        <p:txBody>
+          <a:bodyPr rtlCol="0" anchor="ctr"/>
+          <a:lstStyle/>
+          <a:p>
+            <a:pPr algn="ctr"/>
+            <a:endParaRPr lang="en-IE"/>
+          </a:p>
+        </p:txBody>
+      </p:sp>
+      <p:pic>
+        <p:nvPicPr>
+          <p:cNvPr id="68" name="Graphic 67">
+            <a:extLst>
+              <a:ext uri="{FF2B5EF4-FFF2-40B4-BE49-F238E27FC236}">
+                <a16:creationId xmlns:a16="http://schemas.microsoft.com/office/drawing/2014/main" id="{79778BA5-071C-E578-14A4-26DE3DDFF345}"/>
+              </a:ext>
+            </a:extLst>
+          </p:cNvPr>
+          <p:cNvPicPr>
+            <a:picLocks noChangeAspect="1"/>
+          </p:cNvPicPr>
+          <p:nvPr/>
+        </p:nvPicPr>
+        <p:blipFill rotWithShape="1">
+          <a:blip r:embed="rId15">
+            <a:extLst>
+              <a:ext uri="{28A0092B-C50C-407E-A947-70E740481C1C}">
+                <a14:useLocalDpi xmlns:a14="http://schemas.microsoft.com/office/drawing/2010/main" val="0"/>
+              </a:ext>
+              <a:ext uri="{96DAC541-7B7A-43D3-8B79-37D633B846F1}">
+                <asvg:svgBlip xmlns:asvg="http://schemas.microsoft.com/office/drawing/2016/SVG/main" r:embed="rId16"/>
+              </a:ext>
+            </a:extLst>
+          </a:blip>
+          <a:srcRect r="4697"/>
+          <a:stretch/>
+        </p:blipFill>
+        <p:spPr>
+          <a:xfrm>
+            <a:off x="10530525" y="16915996"/>
+            <a:ext cx="1534466" cy="1911974"/>
+          </a:xfrm>
+          <a:prstGeom prst="rect">
+            <a:avLst/>
+          </a:prstGeom>
+        </p:spPr>
+      </p:pic>
+      <p:cxnSp>
+        <p:nvCxnSpPr>
+          <p:cNvPr id="71" name="Straight Arrow Connector 70">
+            <a:extLst>
+              <a:ext uri="{FF2B5EF4-FFF2-40B4-BE49-F238E27FC236}">
+                <a16:creationId xmlns:a16="http://schemas.microsoft.com/office/drawing/2014/main" id="{D3D7109C-6FA0-C19E-E3E2-69D4B63E3B89}"/>
+              </a:ext>
+            </a:extLst>
+          </p:cNvPr>
+          <p:cNvCxnSpPr>
+            <a:cxnSpLocks/>
+            <a:stCxn id="70" idx="1"/>
+            <a:endCxn id="63" idx="3"/>
+          </p:cNvCxnSpPr>
+          <p:nvPr/>
+        </p:nvCxnSpPr>
+        <p:spPr>
+          <a:xfrm flipH="1">
+            <a:off x="9466729" y="17891717"/>
+            <a:ext cx="948300" cy="2362"/>
+          </a:xfrm>
+          <a:prstGeom prst="straightConnector1">
+            <a:avLst/>
+          </a:prstGeom>
+          <a:ln w="76200">
+            <a:solidFill>
+              <a:srgbClr val="C00000"/>
+            </a:solidFill>
+            <a:headEnd type="triangle"/>
+            <a:tailEnd type="triangle"/>
+          </a:ln>
+        </p:spPr>
+        <p:style>
+          <a:lnRef idx="2">
+            <a:schemeClr val="accent1"/>
+          </a:lnRef>
+          <a:fillRef idx="0">
+            <a:schemeClr val="accent1"/>
+          </a:fillRef>
+          <a:effectRef idx="1">
+            <a:schemeClr val="accent1"/>
+          </a:effectRef>
+          <a:fontRef idx="minor">
+            <a:schemeClr val="tx1"/>
+          </a:fontRef>
+        </p:style>
+      </p:cxnSp>
+      <p:sp>
+        <p:nvSpPr>
+          <p:cNvPr id="78" name="Rectangle: Rounded Corners 77">
+            <a:extLst>
+              <a:ext uri="{FF2B5EF4-FFF2-40B4-BE49-F238E27FC236}">
+                <a16:creationId xmlns:a16="http://schemas.microsoft.com/office/drawing/2014/main" id="{241B78F1-0936-CEF2-03B8-72A60F497A8E}"/>
+              </a:ext>
+            </a:extLst>
+          </p:cNvPr>
+          <p:cNvSpPr/>
+          <p:nvPr/>
+        </p:nvSpPr>
+        <p:spPr>
+          <a:xfrm>
+            <a:off x="12888595" y="16979272"/>
+            <a:ext cx="1775009" cy="1802356"/>
+          </a:xfrm>
+          <a:prstGeom prst="roundRect">
+            <a:avLst/>
+          </a:prstGeom>
+          <a:solidFill>
+            <a:schemeClr val="bg1"/>
+          </a:solidFill>
+        </p:spPr>
+        <p:style>
+          <a:lnRef idx="2">
+            <a:schemeClr val="accent1">
+              <a:shade val="15000"/>
+            </a:schemeClr>
+          </a:lnRef>
+          <a:fillRef idx="1">
+            <a:schemeClr val="accent1"/>
+          </a:fillRef>
+          <a:effectRef idx="0">
+            <a:schemeClr val="accent1"/>
+          </a:effectRef>
+          <a:fontRef idx="minor">
+            <a:schemeClr val="lt1"/>
+          </a:fontRef>
+        </p:style>
+        <p:txBody>
+          <a:bodyPr rtlCol="0" anchor="ctr"/>
+          <a:lstStyle/>
+          <a:p>
+            <a:pPr algn="ctr"/>
+            <a:endParaRPr lang="en-IE"/>
+          </a:p>
+        </p:txBody>
+      </p:sp>
+      <p:pic>
+        <p:nvPicPr>
+          <p:cNvPr id="81" name="Graphic 80">
+            <a:extLst>
+              <a:ext uri="{FF2B5EF4-FFF2-40B4-BE49-F238E27FC236}">
+                <a16:creationId xmlns:a16="http://schemas.microsoft.com/office/drawing/2014/main" id="{751AB44B-7E3C-6D08-DA08-38DF84040F6C}"/>
+              </a:ext>
+            </a:extLst>
+          </p:cNvPr>
+          <p:cNvPicPr>
+            <a:picLocks noChangeAspect="1"/>
+          </p:cNvPicPr>
+          <p:nvPr/>
+        </p:nvPicPr>
+        <p:blipFill rotWithShape="1">
+          <a:blip r:embed="rId15">
+            <a:extLst>
+              <a:ext uri="{28A0092B-C50C-407E-A947-70E740481C1C}">
+                <a14:useLocalDpi xmlns:a14="http://schemas.microsoft.com/office/drawing/2010/main" val="0"/>
+              </a:ext>
+              <a:ext uri="{96DAC541-7B7A-43D3-8B79-37D633B846F1}">
+                <asvg:svgBlip xmlns:asvg="http://schemas.microsoft.com/office/drawing/2016/SVG/main" r:embed="rId16"/>
+              </a:ext>
+            </a:extLst>
+          </a:blip>
+          <a:srcRect r="4697"/>
+          <a:stretch/>
+        </p:blipFill>
+        <p:spPr>
+          <a:xfrm>
+            <a:off x="13008866" y="16916656"/>
+            <a:ext cx="1534466" cy="1911974"/>
+          </a:xfrm>
+          <a:prstGeom prst="rect">
+            <a:avLst/>
+          </a:prstGeom>
+        </p:spPr>
+      </p:pic>
+      <p:cxnSp>
+        <p:nvCxnSpPr>
+          <p:cNvPr id="86" name="Straight Arrow Connector 85">
+            <a:extLst>
+              <a:ext uri="{FF2B5EF4-FFF2-40B4-BE49-F238E27FC236}">
+                <a16:creationId xmlns:a16="http://schemas.microsoft.com/office/drawing/2014/main" id="{772A0477-4F67-BB9F-F9B7-9746A5A740AD}"/>
+              </a:ext>
+            </a:extLst>
+          </p:cNvPr>
+          <p:cNvCxnSpPr>
+            <a:cxnSpLocks/>
+            <a:stCxn id="78" idx="1"/>
+            <a:endCxn id="70" idx="3"/>
+          </p:cNvCxnSpPr>
+          <p:nvPr/>
+        </p:nvCxnSpPr>
+        <p:spPr>
+          <a:xfrm flipH="1">
+            <a:off x="12190038" y="17880450"/>
+            <a:ext cx="698557" cy="11267"/>
+          </a:xfrm>
+          <a:prstGeom prst="straightConnector1">
+            <a:avLst/>
+          </a:prstGeom>
+          <a:ln w="76200">
+            <a:solidFill>
+              <a:srgbClr val="C00000"/>
+            </a:solidFill>
+            <a:headEnd type="triangle"/>
+            <a:tailEnd type="triangle"/>
+          </a:ln>
+        </p:spPr>
+        <p:style>
+          <a:lnRef idx="2">
+            <a:schemeClr val="accent1"/>
+          </a:lnRef>
+          <a:fillRef idx="0">
+            <a:schemeClr val="accent1"/>
+          </a:fillRef>
+          <a:effectRef idx="1">
+            <a:schemeClr val="accent1"/>
+          </a:effectRef>
+          <a:fontRef idx="minor">
+            <a:schemeClr val="tx1"/>
+          </a:fontRef>
+        </p:style>
+      </p:cxnSp>
+      <p:sp>
+        <p:nvSpPr>
+          <p:cNvPr id="95" name="TextBox 94">
+            <a:extLst>
+              <a:ext uri="{FF2B5EF4-FFF2-40B4-BE49-F238E27FC236}">
+                <a16:creationId xmlns:a16="http://schemas.microsoft.com/office/drawing/2014/main" id="{5180DFD4-66B9-79D2-34FE-72D003FA3CAE}"/>
+              </a:ext>
+            </a:extLst>
+          </p:cNvPr>
+          <p:cNvSpPr txBox="1"/>
+          <p:nvPr/>
+        </p:nvSpPr>
+        <p:spPr>
+          <a:xfrm>
+            <a:off x="9501198" y="16990538"/>
+            <a:ext cx="938748" cy="830997"/>
+          </a:xfrm>
+          <a:prstGeom prst="rect">
+            <a:avLst/>
+          </a:prstGeom>
+          <a:noFill/>
+        </p:spPr>
+        <p:txBody>
+          <a:bodyPr wrap="square" rtlCol="0">
+            <a:spAutoFit/>
+          </a:bodyPr>
+          <a:lstStyle/>
+          <a:p>
+            <a:pPr algn="ctr"/>
+            <a:r>
+              <a:rPr lang="en-IE" sz="1200" b="1" dirty="0">
+                <a:latin typeface="Congenial" panose="02000503040000020004" pitchFamily="2" charset="0"/>
+              </a:rPr>
+              <a:t>User uploads assembly to Core #1</a:t>
+            </a:r>
+            <a:endParaRPr lang="en-IE" sz="1200" dirty="0">
+              <a:latin typeface="Congenial" panose="02000503040000020004" pitchFamily="2" charset="0"/>
+            </a:endParaRPr>
+          </a:p>
+        </p:txBody>
+      </p:sp>
+      <p:sp>
+        <p:nvSpPr>
+          <p:cNvPr id="96" name="TextBox 95">
+            <a:extLst>
+              <a:ext uri="{FF2B5EF4-FFF2-40B4-BE49-F238E27FC236}">
+                <a16:creationId xmlns:a16="http://schemas.microsoft.com/office/drawing/2014/main" id="{E4B31120-EBFC-605D-1ACF-53E401CE799E}"/>
+              </a:ext>
+            </a:extLst>
+          </p:cNvPr>
+          <p:cNvSpPr txBox="1"/>
+          <p:nvPr/>
+        </p:nvSpPr>
+        <p:spPr>
+          <a:xfrm>
+            <a:off x="10807298" y="18499147"/>
+            <a:ext cx="993671" cy="276999"/>
+          </a:xfrm>
+          <a:prstGeom prst="rect">
+            <a:avLst/>
+          </a:prstGeom>
+          <a:noFill/>
+        </p:spPr>
+        <p:txBody>
+          <a:bodyPr wrap="square" rtlCol="0">
+            <a:spAutoFit/>
+          </a:bodyPr>
+          <a:lstStyle/>
+          <a:p>
+            <a:pPr algn="ctr"/>
+            <a:r>
+              <a:rPr lang="en-IE" sz="1200" dirty="0">
+                <a:latin typeface="Congenial Black" panose="02000503040000020004" pitchFamily="2" charset="0"/>
+              </a:rPr>
+              <a:t>Core #1</a:t>
+            </a:r>
+          </a:p>
+        </p:txBody>
+      </p:sp>
+      <p:sp>
+        <p:nvSpPr>
+          <p:cNvPr id="98" name="TextBox 97">
+            <a:extLst>
+              <a:ext uri="{FF2B5EF4-FFF2-40B4-BE49-F238E27FC236}">
+                <a16:creationId xmlns:a16="http://schemas.microsoft.com/office/drawing/2014/main" id="{6B0470F1-48CC-1318-A45C-D2B842B4ACF2}"/>
+              </a:ext>
+            </a:extLst>
+          </p:cNvPr>
+          <p:cNvSpPr txBox="1"/>
+          <p:nvPr/>
+        </p:nvSpPr>
+        <p:spPr>
+          <a:xfrm>
+            <a:off x="13285981" y="18499147"/>
+            <a:ext cx="993671" cy="276999"/>
+          </a:xfrm>
+          <a:prstGeom prst="rect">
+            <a:avLst/>
+          </a:prstGeom>
+          <a:noFill/>
+        </p:spPr>
+        <p:txBody>
+          <a:bodyPr wrap="square" rtlCol="0">
+            <a:spAutoFit/>
+          </a:bodyPr>
+          <a:lstStyle/>
+          <a:p>
+            <a:pPr algn="ctr"/>
+            <a:r>
+              <a:rPr lang="en-IE" sz="1200" dirty="0">
+                <a:latin typeface="Congenial Black" panose="02000503040000020004" pitchFamily="2" charset="0"/>
+              </a:rPr>
+              <a:t>Core #2</a:t>
+            </a:r>
+          </a:p>
+        </p:txBody>
+      </p:sp>
+      <p:sp>
+        <p:nvSpPr>
+          <p:cNvPr id="99" name="TextBox 98">
+            <a:extLst>
+              <a:ext uri="{FF2B5EF4-FFF2-40B4-BE49-F238E27FC236}">
+                <a16:creationId xmlns:a16="http://schemas.microsoft.com/office/drawing/2014/main" id="{1148AB63-10CE-A12D-C10C-80C7E6A33439}"/>
+              </a:ext>
+            </a:extLst>
+          </p:cNvPr>
+          <p:cNvSpPr txBox="1"/>
+          <p:nvPr/>
+        </p:nvSpPr>
+        <p:spPr>
+          <a:xfrm>
+            <a:off x="12982354" y="18792895"/>
+            <a:ext cx="1600924" cy="461665"/>
+          </a:xfrm>
+          <a:prstGeom prst="rect">
+            <a:avLst/>
+          </a:prstGeom>
+          <a:noFill/>
+        </p:spPr>
+        <p:txBody>
+          <a:bodyPr wrap="square" rtlCol="0">
+            <a:spAutoFit/>
+          </a:bodyPr>
+          <a:lstStyle/>
+          <a:p>
+            <a:pPr algn="ctr"/>
+            <a:r>
+              <a:rPr lang="en-IE" sz="1200" b="1" dirty="0">
+                <a:latin typeface="Congenial" panose="02000503040000020004" pitchFamily="2" charset="0"/>
+              </a:rPr>
+              <a:t>Core #2 runs hidden program</a:t>
+            </a:r>
+            <a:endParaRPr lang="en-IE" sz="1200" dirty="0">
+              <a:latin typeface="Congenial" panose="02000503040000020004" pitchFamily="2" charset="0"/>
+            </a:endParaRPr>
+          </a:p>
+        </p:txBody>
+      </p:sp>
+      <p:sp>
+        <p:nvSpPr>
+          <p:cNvPr id="102" name="TextBox 101">
+            <a:extLst>
+              <a:ext uri="{FF2B5EF4-FFF2-40B4-BE49-F238E27FC236}">
+                <a16:creationId xmlns:a16="http://schemas.microsoft.com/office/drawing/2014/main" id="{726428DB-54FB-CA8F-8DDF-C1FE0E3C7D4B}"/>
+              </a:ext>
+            </a:extLst>
+          </p:cNvPr>
+          <p:cNvSpPr txBox="1"/>
+          <p:nvPr/>
+        </p:nvSpPr>
+        <p:spPr>
+          <a:xfrm>
+            <a:off x="9483549" y="17979435"/>
+            <a:ext cx="938748" cy="1015663"/>
+          </a:xfrm>
+          <a:prstGeom prst="rect">
+            <a:avLst/>
+          </a:prstGeom>
+          <a:noFill/>
+        </p:spPr>
+        <p:txBody>
+          <a:bodyPr wrap="square" rtlCol="0">
+            <a:spAutoFit/>
+          </a:bodyPr>
+          <a:lstStyle/>
+          <a:p>
+            <a:pPr algn="ctr"/>
+            <a:r>
+              <a:rPr lang="en-IE" sz="1200" b="1" dirty="0">
+                <a:latin typeface="Congenial" panose="02000503040000020004" pitchFamily="2" charset="0"/>
+              </a:rPr>
+              <a:t>User may read memory to view results</a:t>
+            </a:r>
+            <a:endParaRPr lang="en-IE" sz="1200" dirty="0">
+              <a:latin typeface="Congenial" panose="02000503040000020004" pitchFamily="2" charset="0"/>
+            </a:endParaRPr>
+          </a:p>
+        </p:txBody>
+      </p:sp>
     </p:spTree>
     <p:extLst>
       <p:ext uri="{BB962C8B-B14F-4D97-AF65-F5344CB8AC3E}">

</xml_diff>